<commit_message>
Moved elixir overview to beginning
</commit_message>
<xml_diff>
--- a/pres/elixir.pptx
+++ b/pres/elixir.pptx
@@ -12,9 +12,9 @@
   </p:handoutMasterIdLst>
   <p:sldIdLst>
     <p:sldId id="256" r:id="rId2"/>
-    <p:sldId id="257" r:id="rId3"/>
-    <p:sldId id="258" r:id="rId4"/>
-    <p:sldId id="260" r:id="rId5"/>
+    <p:sldId id="260" r:id="rId3"/>
+    <p:sldId id="257" r:id="rId4"/>
+    <p:sldId id="258" r:id="rId5"/>
     <p:sldId id="259" r:id="rId6"/>
     <p:sldId id="261" r:id="rId7"/>
     <p:sldId id="266" r:id="rId8"/>
@@ -982,7 +982,7 @@
           <a:lstStyle/>
           <a:p>
             <a:pPr lvl="0"/>
-            <a:fld id="{4EE1EA7E-F457-4990-B67D-324E224EB1BE}" type="slidenum">
+            <a:fld id="{EC5DB833-571C-4369-8DBD-61A18B09B8A4}" type="slidenum">
               <a:t>2</a:t>
             </a:fld>
             <a:endParaRPr lang="en-US"/>
@@ -1037,7 +1037,7 @@
     </p:spTree>
     <p:extLst>
       <p:ext uri="{BB962C8B-B14F-4D97-AF65-F5344CB8AC3E}">
-        <p14:creationId xmlns:p14="http://schemas.microsoft.com/office/powerpoint/2010/main" val="226873598"/>
+        <p14:creationId xmlns:p14="http://schemas.microsoft.com/office/powerpoint/2010/main" val="2116152230"/>
       </p:ext>
     </p:extLst>
   </p:cSld>
@@ -1084,7 +1084,7 @@
           <a:lstStyle/>
           <a:p>
             <a:pPr lvl="0"/>
-            <a:fld id="{3CE54965-70D2-430D-9953-AE4BF16198B1}" type="slidenum">
+            <a:fld id="{4EE1EA7E-F457-4990-B67D-324E224EB1BE}" type="slidenum">
               <a:t>3</a:t>
             </a:fld>
             <a:endParaRPr lang="en-US"/>
@@ -1139,7 +1139,7 @@
     </p:spTree>
     <p:extLst>
       <p:ext uri="{BB962C8B-B14F-4D97-AF65-F5344CB8AC3E}">
-        <p14:creationId xmlns:p14="http://schemas.microsoft.com/office/powerpoint/2010/main" val="2462653386"/>
+        <p14:creationId xmlns:p14="http://schemas.microsoft.com/office/powerpoint/2010/main" val="226873598"/>
       </p:ext>
     </p:extLst>
   </p:cSld>
@@ -1186,7 +1186,7 @@
           <a:lstStyle/>
           <a:p>
             <a:pPr lvl="0"/>
-            <a:fld id="{EC5DB833-571C-4369-8DBD-61A18B09B8A4}" type="slidenum">
+            <a:fld id="{3CE54965-70D2-430D-9953-AE4BF16198B1}" type="slidenum">
               <a:t>4</a:t>
             </a:fld>
             <a:endParaRPr lang="en-US"/>
@@ -1241,7 +1241,7 @@
     </p:spTree>
     <p:extLst>
       <p:ext uri="{BB962C8B-B14F-4D97-AF65-F5344CB8AC3E}">
-        <p14:creationId xmlns:p14="http://schemas.microsoft.com/office/powerpoint/2010/main" val="2116152230"/>
+        <p14:creationId xmlns:p14="http://schemas.microsoft.com/office/powerpoint/2010/main" val="2462653386"/>
       </p:ext>
     </p:extLst>
   </p:cSld>
@@ -6034,899 +6034,6 @@
 </file>
 
 <file path=ppt/slides/slide2.xml><?xml version="1.0" encoding="utf-8"?>
-<p:sld xmlns:a="http://schemas.openxmlformats.org/drawingml/2006/main" xmlns:r="http://schemas.openxmlformats.org/officeDocument/2006/relationships" xmlns:p="http://schemas.openxmlformats.org/presentationml/2006/main">
-  <p:cSld name="page2">
-    <p:spTree>
-      <p:nvGrpSpPr>
-        <p:cNvPr id="1" name=""/>
-        <p:cNvGrpSpPr/>
-        <p:nvPr/>
-      </p:nvGrpSpPr>
-      <p:grpSpPr>
-        <a:xfrm>
-          <a:off x="0" y="0"/>
-          <a:ext cx="0" cy="0"/>
-          <a:chOff x="0" y="0"/>
-          <a:chExt cx="0" cy="0"/>
-        </a:xfrm>
-      </p:grpSpPr>
-      <p:sp>
-        <p:nvSpPr>
-          <p:cNvPr id="2" name="Subtitle 1"/>
-          <p:cNvSpPr txBox="1">
-            <a:spLocks noGrp="1"/>
-          </p:cNvSpPr>
-          <p:nvPr>
-            <p:ph type="subTitle" idx="4294967295"/>
-          </p:nvPr>
-        </p:nvSpPr>
-        <p:spPr>
-          <a:xfrm>
-            <a:off x="503640" y="1920239"/>
-            <a:ext cx="9068760" cy="3320279"/>
-          </a:xfrm>
-        </p:spPr>
-        <p:txBody>
-          <a:bodyPr anchor="ctr"/>
-          <a:lstStyle/>
-          <a:p>
-            <a:pPr lvl="0" algn="r"/>
-            <a:r>
-              <a:rPr lang="en-US" dirty="0">
-                <a:solidFill>
-                  <a:schemeClr val="tx1">
-                    <a:lumMod val="75000"/>
-                    <a:lumOff val="25000"/>
-                  </a:schemeClr>
-                </a:solidFill>
-                <a:latin typeface="Bitter" pitchFamily="18"/>
-              </a:rPr>
-              <a:t>Elixir is what would happen if </a:t>
-            </a:r>
-            <a:r>
-              <a:rPr lang="en-US" dirty="0" err="1">
-                <a:solidFill>
-                  <a:schemeClr val="tx1">
-                    <a:lumMod val="75000"/>
-                    <a:lumOff val="25000"/>
-                  </a:schemeClr>
-                </a:solidFill>
-                <a:latin typeface="Bitter" pitchFamily="18"/>
-              </a:rPr>
-              <a:t>Erlang</a:t>
-            </a:r>
-            <a:r>
-              <a:rPr lang="en-US" dirty="0">
-                <a:solidFill>
-                  <a:schemeClr val="tx1">
-                    <a:lumMod val="75000"/>
-                    <a:lumOff val="25000"/>
-                  </a:schemeClr>
-                </a:solidFill>
-                <a:latin typeface="Bitter" pitchFamily="18"/>
-              </a:rPr>
-              <a:t>, </a:t>
-            </a:r>
-            <a:r>
-              <a:rPr lang="en-US" dirty="0" err="1">
-                <a:solidFill>
-                  <a:schemeClr val="tx1">
-                    <a:lumMod val="75000"/>
-                    <a:lumOff val="25000"/>
-                  </a:schemeClr>
-                </a:solidFill>
-                <a:latin typeface="Bitter" pitchFamily="18"/>
-              </a:rPr>
-              <a:t>Clojure</a:t>
-            </a:r>
-            <a:r>
-              <a:rPr lang="en-US" dirty="0">
-                <a:solidFill>
-                  <a:schemeClr val="tx1">
-                    <a:lumMod val="75000"/>
-                    <a:lumOff val="25000"/>
-                  </a:schemeClr>
-                </a:solidFill>
-                <a:latin typeface="Bitter" pitchFamily="18"/>
-              </a:rPr>
-              <a:t>, and Ruby somehow had a baby and it wasn’t an accident.</a:t>
-            </a:r>
-          </a:p>
-          <a:p>
-            <a:pPr lvl="0" algn="l"/>
-            <a:endParaRPr lang="en-US" dirty="0">
-              <a:solidFill>
-                <a:srgbClr val="333333"/>
-              </a:solidFill>
-              <a:latin typeface="Bitter" pitchFamily="18"/>
-            </a:endParaRPr>
-          </a:p>
-          <a:p>
-            <a:pPr lvl="0" algn="l"/>
-            <a:r>
-              <a:rPr lang="en-US" dirty="0">
-                <a:solidFill>
-                  <a:srgbClr val="333333"/>
-                </a:solidFill>
-                <a:latin typeface="Bitter" pitchFamily="18"/>
-              </a:rPr>
-              <a:t> </a:t>
-            </a:r>
-            <a:r>
-              <a:rPr lang="en-US" dirty="0">
-                <a:solidFill>
-                  <a:srgbClr val="666666"/>
-                </a:solidFill>
-                <a:latin typeface="Bitter" pitchFamily="18"/>
-              </a:rPr>
-              <a:t>— </a:t>
-            </a:r>
-            <a:r>
-              <a:rPr lang="en-US" i="1" dirty="0">
-                <a:solidFill>
-                  <a:srgbClr val="666666"/>
-                </a:solidFill>
-                <a:latin typeface="Bitter" pitchFamily="18"/>
-              </a:rPr>
-              <a:t>Devin Torres</a:t>
-            </a:r>
-          </a:p>
-        </p:txBody>
-      </p:sp>
-    </p:spTree>
-  </p:cSld>
-  <p:clrMapOvr>
-    <a:masterClrMapping/>
-  </p:clrMapOvr>
-  <mc:AlternateContent xmlns:mc="http://schemas.openxmlformats.org/markup-compatibility/2006" xmlns:p14="http://schemas.microsoft.com/office/powerpoint/2010/main">
-    <mc:Choice Requires="p14">
-      <p:transition spd="slow" p14:dur="2000"/>
-    </mc:Choice>
-    <mc:Fallback xmlns="">
-      <p:transition spd="slow"/>
-    </mc:Fallback>
-  </mc:AlternateContent>
-  <p:timing>
-    <p:tnLst>
-      <p:par>
-        <p:cTn id="1" dur="indefinite" restart="never" nodeType="tmRoot"/>
-      </p:par>
-    </p:tnLst>
-  </p:timing>
-</p:sld>
-</file>
-
-<file path=ppt/slides/slide3.xml><?xml version="1.0" encoding="utf-8"?>
-<p:sld xmlns:a="http://schemas.openxmlformats.org/drawingml/2006/main" xmlns:r="http://schemas.openxmlformats.org/officeDocument/2006/relationships" xmlns:p="http://schemas.openxmlformats.org/presentationml/2006/main">
-  <p:cSld name="page3">
-    <p:spTree>
-      <p:nvGrpSpPr>
-        <p:cNvPr id="1" name=""/>
-        <p:cNvGrpSpPr/>
-        <p:nvPr/>
-      </p:nvGrpSpPr>
-      <p:grpSpPr>
-        <a:xfrm>
-          <a:off x="0" y="0"/>
-          <a:ext cx="0" cy="0"/>
-          <a:chOff x="0" y="0"/>
-          <a:chExt cx="0" cy="0"/>
-        </a:xfrm>
-      </p:grpSpPr>
-      <p:sp>
-        <p:nvSpPr>
-          <p:cNvPr id="2" name="Title 1"/>
-          <p:cNvSpPr txBox="1">
-            <a:spLocks noGrp="1"/>
-          </p:cNvSpPr>
-          <p:nvPr>
-            <p:ph type="title" idx="4294967295"/>
-          </p:nvPr>
-        </p:nvSpPr>
-        <p:spPr>
-          <a:xfrm>
-            <a:off x="4215924" y="6301641"/>
-            <a:ext cx="1586510" cy="677108"/>
-          </a:xfrm>
-        </p:spPr>
-        <p:txBody>
-          <a:bodyPr wrap="square">
-            <a:spAutoFit/>
-          </a:bodyPr>
-          <a:lstStyle/>
-          <a:p>
-            <a:pPr lvl="0" algn="l"/>
-            <a:r>
-              <a:rPr lang="en-US" dirty="0">
-                <a:solidFill>
-                  <a:schemeClr val="tx1">
-                    <a:lumMod val="75000"/>
-                    <a:lumOff val="25000"/>
-                  </a:schemeClr>
-                </a:solidFill>
-                <a:latin typeface="Bitter" pitchFamily="18"/>
-              </a:rPr>
-              <a:t>elixir</a:t>
-            </a:r>
-          </a:p>
-        </p:txBody>
-      </p:sp>
-      <p:pic>
-        <p:nvPicPr>
-          <p:cNvPr id="3" name="Picture 2"/>
-          <p:cNvPicPr>
-            <a:picLocks noChangeAspect="1"/>
-          </p:cNvPicPr>
-          <p:nvPr/>
-        </p:nvPicPr>
-        <p:blipFill>
-          <a:blip r:embed="rId3">
-            <a:alphaModFix/>
-          </a:blip>
-          <a:srcRect/>
-          <a:stretch>
-            <a:fillRect/>
-          </a:stretch>
-        </p:blipFill>
-        <p:spPr>
-          <a:xfrm>
-            <a:off x="4547942" y="5444122"/>
-            <a:ext cx="857159" cy="857519"/>
-          </a:xfrm>
-          <a:prstGeom prst="rect">
-            <a:avLst/>
-          </a:prstGeom>
-          <a:noFill/>
-          <a:ln>
-            <a:noFill/>
-          </a:ln>
-        </p:spPr>
-      </p:pic>
-      <p:sp>
-        <p:nvSpPr>
-          <p:cNvPr id="4" name="Subtitle 3"/>
-          <p:cNvSpPr txBox="1">
-            <a:spLocks noGrp="1"/>
-          </p:cNvSpPr>
-          <p:nvPr>
-            <p:ph type="subTitle" idx="4294967295"/>
-          </p:nvPr>
-        </p:nvSpPr>
-        <p:spPr>
-          <a:xfrm>
-            <a:off x="4215924" y="427703"/>
-            <a:ext cx="1521196" cy="822960"/>
-          </a:xfrm>
-        </p:spPr>
-        <p:txBody>
-          <a:bodyPr anchor="ctr"/>
-          <a:lstStyle/>
-          <a:p>
-            <a:pPr lvl="0" algn="l">
-              <a:lnSpc>
-                <a:spcPct val="150000"/>
-              </a:lnSpc>
-            </a:pPr>
-            <a:r>
-              <a:rPr lang="en-US" dirty="0" err="1">
-                <a:solidFill>
-                  <a:schemeClr val="tx1">
-                    <a:lumMod val="65000"/>
-                    <a:lumOff val="35000"/>
-                  </a:schemeClr>
-                </a:solidFill>
-                <a:latin typeface="Lovelo Black" panose="02000000000000000000" pitchFamily="50" charset="-18"/>
-              </a:rPr>
-              <a:t>Erlang</a:t>
-            </a:r>
-            <a:endParaRPr lang="en-US" dirty="0">
-              <a:solidFill>
-                <a:schemeClr val="tx1">
-                  <a:lumMod val="65000"/>
-                  <a:lumOff val="35000"/>
-                </a:schemeClr>
-              </a:solidFill>
-              <a:latin typeface="Lovelo Black" panose="02000000000000000000" pitchFamily="50" charset="-18"/>
-            </a:endParaRPr>
-          </a:p>
-        </p:txBody>
-      </p:sp>
-      <p:sp>
-        <p:nvSpPr>
-          <p:cNvPr id="5" name="TextBox 4"/>
-          <p:cNvSpPr txBox="1"/>
-          <p:nvPr/>
-        </p:nvSpPr>
-        <p:spPr>
-          <a:xfrm>
-            <a:off x="1343675" y="1250663"/>
-            <a:ext cx="1747525" cy="822960"/>
-          </a:xfrm>
-          <a:prstGeom prst="rect">
-            <a:avLst/>
-          </a:prstGeom>
-          <a:noFill/>
-          <a:ln>
-            <a:noFill/>
-          </a:ln>
-        </p:spPr>
-        <p:txBody>
-          <a:bodyPr lIns="0" tIns="0" rIns="0" bIns="0" anchor="ctr"/>
-          <a:lstStyle/>
-          <a:p>
-            <a:pPr marL="0" marR="0" lvl="0" indent="0" algn="l" rtl="0" hangingPunct="0">
-              <a:lnSpc>
-                <a:spcPct val="150000"/>
-              </a:lnSpc>
-              <a:buNone/>
-              <a:tabLst/>
-              <a:defRPr>
-                <a:latin typeface="Bitter" pitchFamily="2"/>
-              </a:defRPr>
-            </a:pPr>
-            <a:r>
-              <a:rPr lang="en-US" sz="3200" b="0" i="0" u="none" strike="noStrike" kern="1200" cap="none" dirty="0" err="1">
-                <a:ln>
-                  <a:noFill/>
-                </a:ln>
-                <a:solidFill>
-                  <a:schemeClr val="tx1">
-                    <a:lumMod val="65000"/>
-                    <a:lumOff val="35000"/>
-                  </a:schemeClr>
-                </a:solidFill>
-                <a:latin typeface="Lovelo Black" panose="02000000000000000000" pitchFamily="50" charset="-18"/>
-                <a:ea typeface="Droid Sans Fallback" pitchFamily="2"/>
-                <a:cs typeface="FreeSans" pitchFamily="2"/>
-              </a:rPr>
-              <a:t>Clojure</a:t>
-            </a:r>
-            <a:endParaRPr lang="en-US" sz="3200" b="0" i="0" u="none" strike="noStrike" kern="1200" cap="none" dirty="0">
-              <a:ln>
-                <a:noFill/>
-              </a:ln>
-              <a:solidFill>
-                <a:schemeClr val="tx1">
-                  <a:lumMod val="65000"/>
-                  <a:lumOff val="35000"/>
-                </a:schemeClr>
-              </a:solidFill>
-              <a:latin typeface="Lovelo Black" panose="02000000000000000000" pitchFamily="50" charset="-18"/>
-              <a:ea typeface="Droid Sans Fallback" pitchFamily="2"/>
-              <a:cs typeface="FreeSans" pitchFamily="2"/>
-            </a:endParaRPr>
-          </a:p>
-        </p:txBody>
-      </p:sp>
-      <p:sp>
-        <p:nvSpPr>
-          <p:cNvPr id="6" name="TextBox 5"/>
-          <p:cNvSpPr txBox="1"/>
-          <p:nvPr/>
-        </p:nvSpPr>
-        <p:spPr>
-          <a:xfrm>
-            <a:off x="7366818" y="1231980"/>
-            <a:ext cx="1098756" cy="822960"/>
-          </a:xfrm>
-          <a:prstGeom prst="rect">
-            <a:avLst/>
-          </a:prstGeom>
-          <a:noFill/>
-          <a:ln>
-            <a:noFill/>
-          </a:ln>
-        </p:spPr>
-        <p:txBody>
-          <a:bodyPr lIns="0" tIns="0" rIns="0" bIns="0" anchor="ctr"/>
-          <a:lstStyle/>
-          <a:p>
-            <a:pPr marL="0" marR="0" lvl="0" indent="0" algn="l" rtl="0" hangingPunct="0">
-              <a:lnSpc>
-                <a:spcPct val="150000"/>
-              </a:lnSpc>
-              <a:buNone/>
-              <a:tabLst/>
-              <a:defRPr>
-                <a:latin typeface="Bitter" pitchFamily="2"/>
-              </a:defRPr>
-            </a:pPr>
-            <a:r>
-              <a:rPr lang="en-US" sz="3200" b="0" i="0" u="none" strike="noStrike" kern="1200" cap="none" dirty="0">
-                <a:ln>
-                  <a:noFill/>
-                </a:ln>
-                <a:solidFill>
-                  <a:schemeClr val="tx1">
-                    <a:lumMod val="65000"/>
-                    <a:lumOff val="35000"/>
-                  </a:schemeClr>
-                </a:solidFill>
-                <a:latin typeface="Lovelo Black" panose="02000000000000000000" pitchFamily="50" charset="-18"/>
-                <a:ea typeface="Droid Sans Fallback" pitchFamily="2"/>
-                <a:cs typeface="FreeSans" pitchFamily="2"/>
-              </a:rPr>
-              <a:t>Ruby</a:t>
-            </a:r>
-          </a:p>
-        </p:txBody>
-      </p:sp>
-      <p:cxnSp>
-        <p:nvCxnSpPr>
-          <p:cNvPr id="10" name="Straight Arrow Connector 9"/>
-          <p:cNvCxnSpPr/>
-          <p:nvPr/>
-        </p:nvCxnSpPr>
-        <p:spPr>
-          <a:xfrm>
-            <a:off x="4976523" y="1231980"/>
-            <a:ext cx="0" cy="921284"/>
-          </a:xfrm>
-          <a:prstGeom prst="straightConnector1">
-            <a:avLst/>
-          </a:prstGeom>
-          <a:ln w="28575">
-            <a:solidFill>
-              <a:schemeClr val="bg1">
-                <a:lumMod val="75000"/>
-              </a:schemeClr>
-            </a:solidFill>
-            <a:tailEnd type="triangle"/>
-          </a:ln>
-        </p:spPr>
-        <p:style>
-          <a:lnRef idx="3">
-            <a:schemeClr val="accent5"/>
-          </a:lnRef>
-          <a:fillRef idx="0">
-            <a:schemeClr val="accent5"/>
-          </a:fillRef>
-          <a:effectRef idx="2">
-            <a:schemeClr val="accent5"/>
-          </a:effectRef>
-          <a:fontRef idx="minor">
-            <a:schemeClr val="tx1"/>
-          </a:fontRef>
-        </p:style>
-      </p:cxnSp>
-      <p:sp>
-        <p:nvSpPr>
-          <p:cNvPr id="12" name="TextBox 11"/>
-          <p:cNvSpPr txBox="1"/>
-          <p:nvPr/>
-        </p:nvSpPr>
-        <p:spPr>
-          <a:xfrm>
-            <a:off x="4505977" y="2222787"/>
-            <a:ext cx="941091" cy="715089"/>
-          </a:xfrm>
-          <a:prstGeom prst="roundRect">
-            <a:avLst/>
-          </a:prstGeom>
-          <a:noFill/>
-          <a:ln w="28575">
-            <a:noFill/>
-          </a:ln>
-        </p:spPr>
-        <p:style>
-          <a:lnRef idx="2">
-            <a:schemeClr val="dk1"/>
-          </a:lnRef>
-          <a:fillRef idx="1">
-            <a:schemeClr val="lt1"/>
-          </a:fillRef>
-          <a:effectRef idx="0">
-            <a:schemeClr val="dk1"/>
-          </a:effectRef>
-          <a:fontRef idx="minor">
-            <a:schemeClr val="dk1"/>
-          </a:fontRef>
-        </p:style>
-        <p:txBody>
-          <a:bodyPr wrap="square" rtlCol="0">
-            <a:spAutoFit/>
-          </a:bodyPr>
-          <a:lstStyle/>
-          <a:p>
-            <a:pPr algn="ctr"/>
-            <a:r>
-              <a:rPr lang="pl-PL" dirty="0" smtClean="0">
-                <a:solidFill>
-                  <a:schemeClr val="tx1">
-                    <a:lumMod val="65000"/>
-                    <a:lumOff val="35000"/>
-                  </a:schemeClr>
-                </a:solidFill>
-                <a:latin typeface="Bitter" panose="00000500000000000000" pitchFamily="50" charset="-18"/>
-              </a:rPr>
-              <a:t>BEAM</a:t>
-            </a:r>
-          </a:p>
-          <a:p>
-            <a:pPr algn="ctr"/>
-            <a:r>
-              <a:rPr lang="pl-PL" dirty="0" smtClean="0">
-                <a:solidFill>
-                  <a:schemeClr val="tx1">
-                    <a:lumMod val="65000"/>
-                    <a:lumOff val="35000"/>
-                  </a:schemeClr>
-                </a:solidFill>
-                <a:latin typeface="Bitter" panose="00000500000000000000" pitchFamily="50" charset="-18"/>
-              </a:rPr>
-              <a:t>OTP</a:t>
-            </a:r>
-            <a:endParaRPr lang="pl-PL" dirty="0">
-              <a:solidFill>
-                <a:schemeClr val="tx1">
-                  <a:lumMod val="65000"/>
-                  <a:lumOff val="35000"/>
-                </a:schemeClr>
-              </a:solidFill>
-              <a:latin typeface="Bitter" panose="00000500000000000000" pitchFamily="50" charset="-18"/>
-            </a:endParaRPr>
-          </a:p>
-        </p:txBody>
-      </p:sp>
-      <p:cxnSp>
-        <p:nvCxnSpPr>
-          <p:cNvPr id="14" name="Straight Arrow Connector 13"/>
-          <p:cNvCxnSpPr/>
-          <p:nvPr/>
-        </p:nvCxnSpPr>
-        <p:spPr>
-          <a:xfrm>
-            <a:off x="7822961" y="2050166"/>
-            <a:ext cx="0" cy="921284"/>
-          </a:xfrm>
-          <a:prstGeom prst="straightConnector1">
-            <a:avLst/>
-          </a:prstGeom>
-          <a:ln w="28575">
-            <a:solidFill>
-              <a:schemeClr val="bg1">
-                <a:lumMod val="75000"/>
-              </a:schemeClr>
-            </a:solidFill>
-            <a:tailEnd type="triangle"/>
-          </a:ln>
-        </p:spPr>
-        <p:style>
-          <a:lnRef idx="3">
-            <a:schemeClr val="accent5"/>
-          </a:lnRef>
-          <a:fillRef idx="0">
-            <a:schemeClr val="accent5"/>
-          </a:fillRef>
-          <a:effectRef idx="2">
-            <a:schemeClr val="accent5"/>
-          </a:effectRef>
-          <a:fontRef idx="minor">
-            <a:schemeClr val="tx1"/>
-          </a:fontRef>
-        </p:style>
-      </p:cxnSp>
-      <p:sp>
-        <p:nvSpPr>
-          <p:cNvPr id="15" name="TextBox 14"/>
-          <p:cNvSpPr txBox="1"/>
-          <p:nvPr/>
-        </p:nvSpPr>
-        <p:spPr>
-          <a:xfrm>
-            <a:off x="7104149" y="3186482"/>
-            <a:ext cx="1437623" cy="408623"/>
-          </a:xfrm>
-          <a:prstGeom prst="roundRect">
-            <a:avLst/>
-          </a:prstGeom>
-          <a:noFill/>
-          <a:ln w="28575">
-            <a:noFill/>
-          </a:ln>
-        </p:spPr>
-        <p:style>
-          <a:lnRef idx="2">
-            <a:schemeClr val="dk1"/>
-          </a:lnRef>
-          <a:fillRef idx="1">
-            <a:schemeClr val="lt1"/>
-          </a:fillRef>
-          <a:effectRef idx="0">
-            <a:schemeClr val="dk1"/>
-          </a:effectRef>
-          <a:fontRef idx="minor">
-            <a:schemeClr val="dk1"/>
-          </a:fontRef>
-        </p:style>
-        <p:txBody>
-          <a:bodyPr wrap="square" rtlCol="0">
-            <a:spAutoFit/>
-          </a:bodyPr>
-          <a:lstStyle/>
-          <a:p>
-            <a:pPr algn="ctr"/>
-            <a:r>
-              <a:rPr lang="pl-PL" dirty="0" smtClean="0">
-                <a:solidFill>
-                  <a:schemeClr val="tx1">
-                    <a:lumMod val="65000"/>
-                    <a:lumOff val="35000"/>
-                  </a:schemeClr>
-                </a:solidFill>
-                <a:latin typeface="Bitter" panose="00000500000000000000" pitchFamily="50" charset="-18"/>
-              </a:rPr>
-              <a:t>Syntax</a:t>
-            </a:r>
-            <a:endParaRPr lang="pl-PL" dirty="0">
-              <a:solidFill>
-                <a:schemeClr val="tx1">
-                  <a:lumMod val="65000"/>
-                  <a:lumOff val="35000"/>
-                </a:schemeClr>
-              </a:solidFill>
-              <a:latin typeface="Bitter" panose="00000500000000000000" pitchFamily="50" charset="-18"/>
-            </a:endParaRPr>
-          </a:p>
-        </p:txBody>
-      </p:sp>
-      <p:cxnSp>
-        <p:nvCxnSpPr>
-          <p:cNvPr id="16" name="Straight Arrow Connector 15"/>
-          <p:cNvCxnSpPr/>
-          <p:nvPr/>
-        </p:nvCxnSpPr>
-        <p:spPr>
-          <a:xfrm>
-            <a:off x="2120252" y="2073623"/>
-            <a:ext cx="0" cy="921284"/>
-          </a:xfrm>
-          <a:prstGeom prst="straightConnector1">
-            <a:avLst/>
-          </a:prstGeom>
-          <a:ln w="28575">
-            <a:solidFill>
-              <a:schemeClr val="bg1">
-                <a:lumMod val="75000"/>
-              </a:schemeClr>
-            </a:solidFill>
-            <a:tailEnd type="triangle"/>
-          </a:ln>
-        </p:spPr>
-        <p:style>
-          <a:lnRef idx="3">
-            <a:schemeClr val="accent5"/>
-          </a:lnRef>
-          <a:fillRef idx="0">
-            <a:schemeClr val="accent5"/>
-          </a:fillRef>
-          <a:effectRef idx="2">
-            <a:schemeClr val="accent5"/>
-          </a:effectRef>
-          <a:fontRef idx="minor">
-            <a:schemeClr val="tx1"/>
-          </a:fontRef>
-        </p:style>
-      </p:cxnSp>
-      <p:sp>
-        <p:nvSpPr>
-          <p:cNvPr id="17" name="TextBox 16"/>
-          <p:cNvSpPr txBox="1"/>
-          <p:nvPr/>
-        </p:nvSpPr>
-        <p:spPr>
-          <a:xfrm>
-            <a:off x="1343675" y="3033250"/>
-            <a:ext cx="1553153" cy="715089"/>
-          </a:xfrm>
-          <a:prstGeom prst="roundRect">
-            <a:avLst/>
-          </a:prstGeom>
-          <a:noFill/>
-          <a:ln w="28575">
-            <a:noFill/>
-          </a:ln>
-        </p:spPr>
-        <p:style>
-          <a:lnRef idx="2">
-            <a:schemeClr val="dk1"/>
-          </a:lnRef>
-          <a:fillRef idx="1">
-            <a:schemeClr val="lt1"/>
-          </a:fillRef>
-          <a:effectRef idx="0">
-            <a:schemeClr val="dk1"/>
-          </a:effectRef>
-          <a:fontRef idx="minor">
-            <a:schemeClr val="dk1"/>
-          </a:fontRef>
-        </p:style>
-        <p:txBody>
-          <a:bodyPr wrap="square" rtlCol="0">
-            <a:spAutoFit/>
-          </a:bodyPr>
-          <a:lstStyle/>
-          <a:p>
-            <a:pPr algn="ctr"/>
-            <a:r>
-              <a:rPr lang="pl-PL" dirty="0" smtClean="0">
-                <a:solidFill>
-                  <a:schemeClr val="tx1">
-                    <a:lumMod val="65000"/>
-                    <a:lumOff val="35000"/>
-                  </a:schemeClr>
-                </a:solidFill>
-                <a:latin typeface="Bitter" panose="00000500000000000000" pitchFamily="50" charset="-18"/>
-              </a:rPr>
-              <a:t>Makra</a:t>
-            </a:r>
-          </a:p>
-          <a:p>
-            <a:pPr algn="ctr"/>
-            <a:r>
-              <a:rPr lang="pl-PL" dirty="0" smtClean="0">
-                <a:solidFill>
-                  <a:schemeClr val="tx1">
-                    <a:lumMod val="65000"/>
-                    <a:lumOff val="35000"/>
-                  </a:schemeClr>
-                </a:solidFill>
-                <a:latin typeface="Bitter" panose="00000500000000000000" pitchFamily="50" charset="-18"/>
-              </a:rPr>
-              <a:t>Protokoły</a:t>
-            </a:r>
-            <a:endParaRPr lang="pl-PL" dirty="0">
-              <a:solidFill>
-                <a:schemeClr val="tx1">
-                  <a:lumMod val="65000"/>
-                  <a:lumOff val="35000"/>
-                </a:schemeClr>
-              </a:solidFill>
-              <a:latin typeface="Bitter" panose="00000500000000000000" pitchFamily="50" charset="-18"/>
-            </a:endParaRPr>
-          </a:p>
-        </p:txBody>
-      </p:sp>
-      <p:cxnSp>
-        <p:nvCxnSpPr>
-          <p:cNvPr id="18" name="Straight Arrow Connector 17"/>
-          <p:cNvCxnSpPr>
-            <a:stCxn id="17" idx="2"/>
-          </p:cNvCxnSpPr>
-          <p:nvPr/>
-        </p:nvCxnSpPr>
-        <p:spPr>
-          <a:xfrm>
-            <a:off x="2120252" y="3748339"/>
-            <a:ext cx="2530406" cy="1600409"/>
-          </a:xfrm>
-          <a:prstGeom prst="straightConnector1">
-            <a:avLst/>
-          </a:prstGeom>
-          <a:ln w="28575">
-            <a:solidFill>
-              <a:schemeClr val="bg1">
-                <a:lumMod val="75000"/>
-              </a:schemeClr>
-            </a:solidFill>
-            <a:tailEnd type="triangle"/>
-          </a:ln>
-        </p:spPr>
-        <p:style>
-          <a:lnRef idx="3">
-            <a:schemeClr val="accent5"/>
-          </a:lnRef>
-          <a:fillRef idx="0">
-            <a:schemeClr val="accent5"/>
-          </a:fillRef>
-          <a:effectRef idx="2">
-            <a:schemeClr val="accent5"/>
-          </a:effectRef>
-          <a:fontRef idx="minor">
-            <a:schemeClr val="tx1"/>
-          </a:fontRef>
-        </p:style>
-      </p:cxnSp>
-      <p:cxnSp>
-        <p:nvCxnSpPr>
-          <p:cNvPr id="20" name="Straight Arrow Connector 19"/>
-          <p:cNvCxnSpPr/>
-          <p:nvPr/>
-        </p:nvCxnSpPr>
-        <p:spPr>
-          <a:xfrm>
-            <a:off x="4976522" y="3033250"/>
-            <a:ext cx="0" cy="2315498"/>
-          </a:xfrm>
-          <a:prstGeom prst="straightConnector1">
-            <a:avLst/>
-          </a:prstGeom>
-          <a:ln w="28575">
-            <a:solidFill>
-              <a:schemeClr val="bg1">
-                <a:lumMod val="75000"/>
-              </a:schemeClr>
-            </a:solidFill>
-            <a:tailEnd type="triangle"/>
-          </a:ln>
-        </p:spPr>
-        <p:style>
-          <a:lnRef idx="3">
-            <a:schemeClr val="accent5"/>
-          </a:lnRef>
-          <a:fillRef idx="0">
-            <a:schemeClr val="accent5"/>
-          </a:fillRef>
-          <a:effectRef idx="2">
-            <a:schemeClr val="accent5"/>
-          </a:effectRef>
-          <a:fontRef idx="minor">
-            <a:schemeClr val="tx1"/>
-          </a:fontRef>
-        </p:style>
-      </p:cxnSp>
-      <p:cxnSp>
-        <p:nvCxnSpPr>
-          <p:cNvPr id="22" name="Straight Arrow Connector 21"/>
-          <p:cNvCxnSpPr/>
-          <p:nvPr/>
-        </p:nvCxnSpPr>
-        <p:spPr>
-          <a:xfrm flipH="1">
-            <a:off x="5299235" y="3748339"/>
-            <a:ext cx="2523725" cy="1600409"/>
-          </a:xfrm>
-          <a:prstGeom prst="straightConnector1">
-            <a:avLst/>
-          </a:prstGeom>
-          <a:ln w="28575">
-            <a:solidFill>
-              <a:schemeClr val="bg1">
-                <a:lumMod val="75000"/>
-              </a:schemeClr>
-            </a:solidFill>
-            <a:tailEnd type="triangle"/>
-          </a:ln>
-        </p:spPr>
-        <p:style>
-          <a:lnRef idx="3">
-            <a:schemeClr val="accent5"/>
-          </a:lnRef>
-          <a:fillRef idx="0">
-            <a:schemeClr val="accent5"/>
-          </a:fillRef>
-          <a:effectRef idx="2">
-            <a:schemeClr val="accent5"/>
-          </a:effectRef>
-          <a:fontRef idx="minor">
-            <a:schemeClr val="tx1"/>
-          </a:fontRef>
-        </p:style>
-      </p:cxnSp>
-    </p:spTree>
-  </p:cSld>
-  <p:clrMapOvr>
-    <a:masterClrMapping/>
-  </p:clrMapOvr>
-  <mc:AlternateContent xmlns:mc="http://schemas.openxmlformats.org/markup-compatibility/2006" xmlns:p14="http://schemas.microsoft.com/office/powerpoint/2010/main">
-    <mc:Choice Requires="p14">
-      <p:transition spd="slow" p14:dur="2000"/>
-    </mc:Choice>
-    <mc:Fallback xmlns="">
-      <p:transition spd="slow"/>
-    </mc:Fallback>
-  </mc:AlternateContent>
-  <p:timing>
-    <p:tnLst>
-      <p:par>
-        <p:cTn id="1" dur="indefinite" restart="never" nodeType="tmRoot"/>
-      </p:par>
-    </p:tnLst>
-  </p:timing>
-</p:sld>
-</file>
-
-<file path=ppt/slides/slide4.xml><?xml version="1.0" encoding="utf-8"?>
 <p:sld xmlns:a="http://schemas.openxmlformats.org/drawingml/2006/main" xmlns:r="http://schemas.openxmlformats.org/officeDocument/2006/relationships" xmlns:p="http://schemas.openxmlformats.org/presentationml/2006/main">
   <p:cSld name="page5">
     <p:spTree>
@@ -7966,6 +7073,899 @@
 </p:sld>
 </file>
 
+<file path=ppt/slides/slide3.xml><?xml version="1.0" encoding="utf-8"?>
+<p:sld xmlns:a="http://schemas.openxmlformats.org/drawingml/2006/main" xmlns:r="http://schemas.openxmlformats.org/officeDocument/2006/relationships" xmlns:p="http://schemas.openxmlformats.org/presentationml/2006/main">
+  <p:cSld name="page2">
+    <p:spTree>
+      <p:nvGrpSpPr>
+        <p:cNvPr id="1" name=""/>
+        <p:cNvGrpSpPr/>
+        <p:nvPr/>
+      </p:nvGrpSpPr>
+      <p:grpSpPr>
+        <a:xfrm>
+          <a:off x="0" y="0"/>
+          <a:ext cx="0" cy="0"/>
+          <a:chOff x="0" y="0"/>
+          <a:chExt cx="0" cy="0"/>
+        </a:xfrm>
+      </p:grpSpPr>
+      <p:sp>
+        <p:nvSpPr>
+          <p:cNvPr id="2" name="Subtitle 1"/>
+          <p:cNvSpPr txBox="1">
+            <a:spLocks noGrp="1"/>
+          </p:cNvSpPr>
+          <p:nvPr>
+            <p:ph type="subTitle" idx="4294967295"/>
+          </p:nvPr>
+        </p:nvSpPr>
+        <p:spPr>
+          <a:xfrm>
+            <a:off x="503640" y="1920239"/>
+            <a:ext cx="9068760" cy="3320279"/>
+          </a:xfrm>
+        </p:spPr>
+        <p:txBody>
+          <a:bodyPr anchor="ctr"/>
+          <a:lstStyle/>
+          <a:p>
+            <a:pPr lvl="0" algn="r"/>
+            <a:r>
+              <a:rPr lang="en-US" dirty="0">
+                <a:solidFill>
+                  <a:schemeClr val="tx1">
+                    <a:lumMod val="75000"/>
+                    <a:lumOff val="25000"/>
+                  </a:schemeClr>
+                </a:solidFill>
+                <a:latin typeface="Bitter" pitchFamily="18"/>
+              </a:rPr>
+              <a:t>Elixir is what would happen if </a:t>
+            </a:r>
+            <a:r>
+              <a:rPr lang="en-US" dirty="0" err="1">
+                <a:solidFill>
+                  <a:schemeClr val="tx1">
+                    <a:lumMod val="75000"/>
+                    <a:lumOff val="25000"/>
+                  </a:schemeClr>
+                </a:solidFill>
+                <a:latin typeface="Bitter" pitchFamily="18"/>
+              </a:rPr>
+              <a:t>Erlang</a:t>
+            </a:r>
+            <a:r>
+              <a:rPr lang="en-US" dirty="0">
+                <a:solidFill>
+                  <a:schemeClr val="tx1">
+                    <a:lumMod val="75000"/>
+                    <a:lumOff val="25000"/>
+                  </a:schemeClr>
+                </a:solidFill>
+                <a:latin typeface="Bitter" pitchFamily="18"/>
+              </a:rPr>
+              <a:t>, </a:t>
+            </a:r>
+            <a:r>
+              <a:rPr lang="en-US" dirty="0" err="1">
+                <a:solidFill>
+                  <a:schemeClr val="tx1">
+                    <a:lumMod val="75000"/>
+                    <a:lumOff val="25000"/>
+                  </a:schemeClr>
+                </a:solidFill>
+                <a:latin typeface="Bitter" pitchFamily="18"/>
+              </a:rPr>
+              <a:t>Clojure</a:t>
+            </a:r>
+            <a:r>
+              <a:rPr lang="en-US" dirty="0">
+                <a:solidFill>
+                  <a:schemeClr val="tx1">
+                    <a:lumMod val="75000"/>
+                    <a:lumOff val="25000"/>
+                  </a:schemeClr>
+                </a:solidFill>
+                <a:latin typeface="Bitter" pitchFamily="18"/>
+              </a:rPr>
+              <a:t>, and Ruby somehow had a baby and it wasn’t an accident.</a:t>
+            </a:r>
+          </a:p>
+          <a:p>
+            <a:pPr lvl="0" algn="l"/>
+            <a:endParaRPr lang="en-US" dirty="0">
+              <a:solidFill>
+                <a:srgbClr val="333333"/>
+              </a:solidFill>
+              <a:latin typeface="Bitter" pitchFamily="18"/>
+            </a:endParaRPr>
+          </a:p>
+          <a:p>
+            <a:pPr lvl="0" algn="l"/>
+            <a:r>
+              <a:rPr lang="en-US" dirty="0">
+                <a:solidFill>
+                  <a:srgbClr val="333333"/>
+                </a:solidFill>
+                <a:latin typeface="Bitter" pitchFamily="18"/>
+              </a:rPr>
+              <a:t> </a:t>
+            </a:r>
+            <a:r>
+              <a:rPr lang="en-US" dirty="0">
+                <a:solidFill>
+                  <a:srgbClr val="666666"/>
+                </a:solidFill>
+                <a:latin typeface="Bitter" pitchFamily="18"/>
+              </a:rPr>
+              <a:t>— </a:t>
+            </a:r>
+            <a:r>
+              <a:rPr lang="en-US" i="1" dirty="0">
+                <a:solidFill>
+                  <a:srgbClr val="666666"/>
+                </a:solidFill>
+                <a:latin typeface="Bitter" pitchFamily="18"/>
+              </a:rPr>
+              <a:t>Devin Torres</a:t>
+            </a:r>
+          </a:p>
+        </p:txBody>
+      </p:sp>
+    </p:spTree>
+  </p:cSld>
+  <p:clrMapOvr>
+    <a:masterClrMapping/>
+  </p:clrMapOvr>
+  <mc:AlternateContent xmlns:mc="http://schemas.openxmlformats.org/markup-compatibility/2006" xmlns:p14="http://schemas.microsoft.com/office/powerpoint/2010/main">
+    <mc:Choice Requires="p14">
+      <p:transition spd="slow" p14:dur="2000"/>
+    </mc:Choice>
+    <mc:Fallback xmlns="">
+      <p:transition spd="slow"/>
+    </mc:Fallback>
+  </mc:AlternateContent>
+  <p:timing>
+    <p:tnLst>
+      <p:par>
+        <p:cTn id="1" dur="indefinite" restart="never" nodeType="tmRoot"/>
+      </p:par>
+    </p:tnLst>
+  </p:timing>
+</p:sld>
+</file>
+
+<file path=ppt/slides/slide4.xml><?xml version="1.0" encoding="utf-8"?>
+<p:sld xmlns:a="http://schemas.openxmlformats.org/drawingml/2006/main" xmlns:r="http://schemas.openxmlformats.org/officeDocument/2006/relationships" xmlns:p="http://schemas.openxmlformats.org/presentationml/2006/main">
+  <p:cSld name="page3">
+    <p:spTree>
+      <p:nvGrpSpPr>
+        <p:cNvPr id="1" name=""/>
+        <p:cNvGrpSpPr/>
+        <p:nvPr/>
+      </p:nvGrpSpPr>
+      <p:grpSpPr>
+        <a:xfrm>
+          <a:off x="0" y="0"/>
+          <a:ext cx="0" cy="0"/>
+          <a:chOff x="0" y="0"/>
+          <a:chExt cx="0" cy="0"/>
+        </a:xfrm>
+      </p:grpSpPr>
+      <p:sp>
+        <p:nvSpPr>
+          <p:cNvPr id="2" name="Title 1"/>
+          <p:cNvSpPr txBox="1">
+            <a:spLocks noGrp="1"/>
+          </p:cNvSpPr>
+          <p:nvPr>
+            <p:ph type="title" idx="4294967295"/>
+          </p:nvPr>
+        </p:nvSpPr>
+        <p:spPr>
+          <a:xfrm>
+            <a:off x="4215924" y="6301641"/>
+            <a:ext cx="1586510" cy="677108"/>
+          </a:xfrm>
+        </p:spPr>
+        <p:txBody>
+          <a:bodyPr wrap="square">
+            <a:spAutoFit/>
+          </a:bodyPr>
+          <a:lstStyle/>
+          <a:p>
+            <a:pPr lvl="0" algn="l"/>
+            <a:r>
+              <a:rPr lang="en-US" dirty="0">
+                <a:solidFill>
+                  <a:schemeClr val="tx1">
+                    <a:lumMod val="75000"/>
+                    <a:lumOff val="25000"/>
+                  </a:schemeClr>
+                </a:solidFill>
+                <a:latin typeface="Bitter" pitchFamily="18"/>
+              </a:rPr>
+              <a:t>elixir</a:t>
+            </a:r>
+          </a:p>
+        </p:txBody>
+      </p:sp>
+      <p:pic>
+        <p:nvPicPr>
+          <p:cNvPr id="3" name="Picture 2"/>
+          <p:cNvPicPr>
+            <a:picLocks noChangeAspect="1"/>
+          </p:cNvPicPr>
+          <p:nvPr/>
+        </p:nvPicPr>
+        <p:blipFill>
+          <a:blip r:embed="rId3">
+            <a:alphaModFix/>
+          </a:blip>
+          <a:srcRect/>
+          <a:stretch>
+            <a:fillRect/>
+          </a:stretch>
+        </p:blipFill>
+        <p:spPr>
+          <a:xfrm>
+            <a:off x="4547942" y="5444122"/>
+            <a:ext cx="857159" cy="857519"/>
+          </a:xfrm>
+          <a:prstGeom prst="rect">
+            <a:avLst/>
+          </a:prstGeom>
+          <a:noFill/>
+          <a:ln>
+            <a:noFill/>
+          </a:ln>
+        </p:spPr>
+      </p:pic>
+      <p:sp>
+        <p:nvSpPr>
+          <p:cNvPr id="4" name="Subtitle 3"/>
+          <p:cNvSpPr txBox="1">
+            <a:spLocks noGrp="1"/>
+          </p:cNvSpPr>
+          <p:nvPr>
+            <p:ph type="subTitle" idx="4294967295"/>
+          </p:nvPr>
+        </p:nvSpPr>
+        <p:spPr>
+          <a:xfrm>
+            <a:off x="4215924" y="427703"/>
+            <a:ext cx="1521196" cy="822960"/>
+          </a:xfrm>
+        </p:spPr>
+        <p:txBody>
+          <a:bodyPr anchor="ctr"/>
+          <a:lstStyle/>
+          <a:p>
+            <a:pPr lvl="0" algn="l">
+              <a:lnSpc>
+                <a:spcPct val="150000"/>
+              </a:lnSpc>
+            </a:pPr>
+            <a:r>
+              <a:rPr lang="en-US" dirty="0" err="1">
+                <a:solidFill>
+                  <a:schemeClr val="tx1">
+                    <a:lumMod val="65000"/>
+                    <a:lumOff val="35000"/>
+                  </a:schemeClr>
+                </a:solidFill>
+                <a:latin typeface="Lovelo Black" panose="02000000000000000000" pitchFamily="50" charset="-18"/>
+              </a:rPr>
+              <a:t>Erlang</a:t>
+            </a:r>
+            <a:endParaRPr lang="en-US" dirty="0">
+              <a:solidFill>
+                <a:schemeClr val="tx1">
+                  <a:lumMod val="65000"/>
+                  <a:lumOff val="35000"/>
+                </a:schemeClr>
+              </a:solidFill>
+              <a:latin typeface="Lovelo Black" panose="02000000000000000000" pitchFamily="50" charset="-18"/>
+            </a:endParaRPr>
+          </a:p>
+        </p:txBody>
+      </p:sp>
+      <p:sp>
+        <p:nvSpPr>
+          <p:cNvPr id="5" name="TextBox 4"/>
+          <p:cNvSpPr txBox="1"/>
+          <p:nvPr/>
+        </p:nvSpPr>
+        <p:spPr>
+          <a:xfrm>
+            <a:off x="1343675" y="1250663"/>
+            <a:ext cx="1747525" cy="822960"/>
+          </a:xfrm>
+          <a:prstGeom prst="rect">
+            <a:avLst/>
+          </a:prstGeom>
+          <a:noFill/>
+          <a:ln>
+            <a:noFill/>
+          </a:ln>
+        </p:spPr>
+        <p:txBody>
+          <a:bodyPr lIns="0" tIns="0" rIns="0" bIns="0" anchor="ctr"/>
+          <a:lstStyle/>
+          <a:p>
+            <a:pPr marL="0" marR="0" lvl="0" indent="0" algn="l" rtl="0" hangingPunct="0">
+              <a:lnSpc>
+                <a:spcPct val="150000"/>
+              </a:lnSpc>
+              <a:buNone/>
+              <a:tabLst/>
+              <a:defRPr>
+                <a:latin typeface="Bitter" pitchFamily="2"/>
+              </a:defRPr>
+            </a:pPr>
+            <a:r>
+              <a:rPr lang="en-US" sz="3200" b="0" i="0" u="none" strike="noStrike" kern="1200" cap="none" dirty="0" err="1">
+                <a:ln>
+                  <a:noFill/>
+                </a:ln>
+                <a:solidFill>
+                  <a:schemeClr val="tx1">
+                    <a:lumMod val="65000"/>
+                    <a:lumOff val="35000"/>
+                  </a:schemeClr>
+                </a:solidFill>
+                <a:latin typeface="Lovelo Black" panose="02000000000000000000" pitchFamily="50" charset="-18"/>
+                <a:ea typeface="Droid Sans Fallback" pitchFamily="2"/>
+                <a:cs typeface="FreeSans" pitchFamily="2"/>
+              </a:rPr>
+              <a:t>Clojure</a:t>
+            </a:r>
+            <a:endParaRPr lang="en-US" sz="3200" b="0" i="0" u="none" strike="noStrike" kern="1200" cap="none" dirty="0">
+              <a:ln>
+                <a:noFill/>
+              </a:ln>
+              <a:solidFill>
+                <a:schemeClr val="tx1">
+                  <a:lumMod val="65000"/>
+                  <a:lumOff val="35000"/>
+                </a:schemeClr>
+              </a:solidFill>
+              <a:latin typeface="Lovelo Black" panose="02000000000000000000" pitchFamily="50" charset="-18"/>
+              <a:ea typeface="Droid Sans Fallback" pitchFamily="2"/>
+              <a:cs typeface="FreeSans" pitchFamily="2"/>
+            </a:endParaRPr>
+          </a:p>
+        </p:txBody>
+      </p:sp>
+      <p:sp>
+        <p:nvSpPr>
+          <p:cNvPr id="6" name="TextBox 5"/>
+          <p:cNvSpPr txBox="1"/>
+          <p:nvPr/>
+        </p:nvSpPr>
+        <p:spPr>
+          <a:xfrm>
+            <a:off x="7366818" y="1231980"/>
+            <a:ext cx="1098756" cy="822960"/>
+          </a:xfrm>
+          <a:prstGeom prst="rect">
+            <a:avLst/>
+          </a:prstGeom>
+          <a:noFill/>
+          <a:ln>
+            <a:noFill/>
+          </a:ln>
+        </p:spPr>
+        <p:txBody>
+          <a:bodyPr lIns="0" tIns="0" rIns="0" bIns="0" anchor="ctr"/>
+          <a:lstStyle/>
+          <a:p>
+            <a:pPr marL="0" marR="0" lvl="0" indent="0" algn="l" rtl="0" hangingPunct="0">
+              <a:lnSpc>
+                <a:spcPct val="150000"/>
+              </a:lnSpc>
+              <a:buNone/>
+              <a:tabLst/>
+              <a:defRPr>
+                <a:latin typeface="Bitter" pitchFamily="2"/>
+              </a:defRPr>
+            </a:pPr>
+            <a:r>
+              <a:rPr lang="en-US" sz="3200" b="0" i="0" u="none" strike="noStrike" kern="1200" cap="none" dirty="0">
+                <a:ln>
+                  <a:noFill/>
+                </a:ln>
+                <a:solidFill>
+                  <a:schemeClr val="tx1">
+                    <a:lumMod val="65000"/>
+                    <a:lumOff val="35000"/>
+                  </a:schemeClr>
+                </a:solidFill>
+                <a:latin typeface="Lovelo Black" panose="02000000000000000000" pitchFamily="50" charset="-18"/>
+                <a:ea typeface="Droid Sans Fallback" pitchFamily="2"/>
+                <a:cs typeface="FreeSans" pitchFamily="2"/>
+              </a:rPr>
+              <a:t>Ruby</a:t>
+            </a:r>
+          </a:p>
+        </p:txBody>
+      </p:sp>
+      <p:cxnSp>
+        <p:nvCxnSpPr>
+          <p:cNvPr id="10" name="Straight Arrow Connector 9"/>
+          <p:cNvCxnSpPr/>
+          <p:nvPr/>
+        </p:nvCxnSpPr>
+        <p:spPr>
+          <a:xfrm>
+            <a:off x="4976523" y="1231980"/>
+            <a:ext cx="0" cy="921284"/>
+          </a:xfrm>
+          <a:prstGeom prst="straightConnector1">
+            <a:avLst/>
+          </a:prstGeom>
+          <a:ln w="28575">
+            <a:solidFill>
+              <a:schemeClr val="bg1">
+                <a:lumMod val="75000"/>
+              </a:schemeClr>
+            </a:solidFill>
+            <a:tailEnd type="triangle"/>
+          </a:ln>
+        </p:spPr>
+        <p:style>
+          <a:lnRef idx="3">
+            <a:schemeClr val="accent5"/>
+          </a:lnRef>
+          <a:fillRef idx="0">
+            <a:schemeClr val="accent5"/>
+          </a:fillRef>
+          <a:effectRef idx="2">
+            <a:schemeClr val="accent5"/>
+          </a:effectRef>
+          <a:fontRef idx="minor">
+            <a:schemeClr val="tx1"/>
+          </a:fontRef>
+        </p:style>
+      </p:cxnSp>
+      <p:sp>
+        <p:nvSpPr>
+          <p:cNvPr id="12" name="TextBox 11"/>
+          <p:cNvSpPr txBox="1"/>
+          <p:nvPr/>
+        </p:nvSpPr>
+        <p:spPr>
+          <a:xfrm>
+            <a:off x="4505977" y="2222787"/>
+            <a:ext cx="941091" cy="715089"/>
+          </a:xfrm>
+          <a:prstGeom prst="roundRect">
+            <a:avLst/>
+          </a:prstGeom>
+          <a:noFill/>
+          <a:ln w="28575">
+            <a:noFill/>
+          </a:ln>
+        </p:spPr>
+        <p:style>
+          <a:lnRef idx="2">
+            <a:schemeClr val="dk1"/>
+          </a:lnRef>
+          <a:fillRef idx="1">
+            <a:schemeClr val="lt1"/>
+          </a:fillRef>
+          <a:effectRef idx="0">
+            <a:schemeClr val="dk1"/>
+          </a:effectRef>
+          <a:fontRef idx="minor">
+            <a:schemeClr val="dk1"/>
+          </a:fontRef>
+        </p:style>
+        <p:txBody>
+          <a:bodyPr wrap="square" rtlCol="0">
+            <a:spAutoFit/>
+          </a:bodyPr>
+          <a:lstStyle/>
+          <a:p>
+            <a:pPr algn="ctr"/>
+            <a:r>
+              <a:rPr lang="pl-PL" dirty="0" smtClean="0">
+                <a:solidFill>
+                  <a:schemeClr val="tx1">
+                    <a:lumMod val="65000"/>
+                    <a:lumOff val="35000"/>
+                  </a:schemeClr>
+                </a:solidFill>
+                <a:latin typeface="Bitter" panose="00000500000000000000" pitchFamily="50" charset="-18"/>
+              </a:rPr>
+              <a:t>BEAM</a:t>
+            </a:r>
+          </a:p>
+          <a:p>
+            <a:pPr algn="ctr"/>
+            <a:r>
+              <a:rPr lang="pl-PL" dirty="0" smtClean="0">
+                <a:solidFill>
+                  <a:schemeClr val="tx1">
+                    <a:lumMod val="65000"/>
+                    <a:lumOff val="35000"/>
+                  </a:schemeClr>
+                </a:solidFill>
+                <a:latin typeface="Bitter" panose="00000500000000000000" pitchFamily="50" charset="-18"/>
+              </a:rPr>
+              <a:t>OTP</a:t>
+            </a:r>
+            <a:endParaRPr lang="pl-PL" dirty="0">
+              <a:solidFill>
+                <a:schemeClr val="tx1">
+                  <a:lumMod val="65000"/>
+                  <a:lumOff val="35000"/>
+                </a:schemeClr>
+              </a:solidFill>
+              <a:latin typeface="Bitter" panose="00000500000000000000" pitchFamily="50" charset="-18"/>
+            </a:endParaRPr>
+          </a:p>
+        </p:txBody>
+      </p:sp>
+      <p:cxnSp>
+        <p:nvCxnSpPr>
+          <p:cNvPr id="14" name="Straight Arrow Connector 13"/>
+          <p:cNvCxnSpPr/>
+          <p:nvPr/>
+        </p:nvCxnSpPr>
+        <p:spPr>
+          <a:xfrm>
+            <a:off x="7822961" y="2050166"/>
+            <a:ext cx="0" cy="921284"/>
+          </a:xfrm>
+          <a:prstGeom prst="straightConnector1">
+            <a:avLst/>
+          </a:prstGeom>
+          <a:ln w="28575">
+            <a:solidFill>
+              <a:schemeClr val="bg1">
+                <a:lumMod val="75000"/>
+              </a:schemeClr>
+            </a:solidFill>
+            <a:tailEnd type="triangle"/>
+          </a:ln>
+        </p:spPr>
+        <p:style>
+          <a:lnRef idx="3">
+            <a:schemeClr val="accent5"/>
+          </a:lnRef>
+          <a:fillRef idx="0">
+            <a:schemeClr val="accent5"/>
+          </a:fillRef>
+          <a:effectRef idx="2">
+            <a:schemeClr val="accent5"/>
+          </a:effectRef>
+          <a:fontRef idx="minor">
+            <a:schemeClr val="tx1"/>
+          </a:fontRef>
+        </p:style>
+      </p:cxnSp>
+      <p:sp>
+        <p:nvSpPr>
+          <p:cNvPr id="15" name="TextBox 14"/>
+          <p:cNvSpPr txBox="1"/>
+          <p:nvPr/>
+        </p:nvSpPr>
+        <p:spPr>
+          <a:xfrm>
+            <a:off x="7104149" y="3186482"/>
+            <a:ext cx="1437623" cy="408623"/>
+          </a:xfrm>
+          <a:prstGeom prst="roundRect">
+            <a:avLst/>
+          </a:prstGeom>
+          <a:noFill/>
+          <a:ln w="28575">
+            <a:noFill/>
+          </a:ln>
+        </p:spPr>
+        <p:style>
+          <a:lnRef idx="2">
+            <a:schemeClr val="dk1"/>
+          </a:lnRef>
+          <a:fillRef idx="1">
+            <a:schemeClr val="lt1"/>
+          </a:fillRef>
+          <a:effectRef idx="0">
+            <a:schemeClr val="dk1"/>
+          </a:effectRef>
+          <a:fontRef idx="minor">
+            <a:schemeClr val="dk1"/>
+          </a:fontRef>
+        </p:style>
+        <p:txBody>
+          <a:bodyPr wrap="square" rtlCol="0">
+            <a:spAutoFit/>
+          </a:bodyPr>
+          <a:lstStyle/>
+          <a:p>
+            <a:pPr algn="ctr"/>
+            <a:r>
+              <a:rPr lang="pl-PL" dirty="0" smtClean="0">
+                <a:solidFill>
+                  <a:schemeClr val="tx1">
+                    <a:lumMod val="65000"/>
+                    <a:lumOff val="35000"/>
+                  </a:schemeClr>
+                </a:solidFill>
+                <a:latin typeface="Bitter" panose="00000500000000000000" pitchFamily="50" charset="-18"/>
+              </a:rPr>
+              <a:t>Syntax</a:t>
+            </a:r>
+            <a:endParaRPr lang="pl-PL" dirty="0">
+              <a:solidFill>
+                <a:schemeClr val="tx1">
+                  <a:lumMod val="65000"/>
+                  <a:lumOff val="35000"/>
+                </a:schemeClr>
+              </a:solidFill>
+              <a:latin typeface="Bitter" panose="00000500000000000000" pitchFamily="50" charset="-18"/>
+            </a:endParaRPr>
+          </a:p>
+        </p:txBody>
+      </p:sp>
+      <p:cxnSp>
+        <p:nvCxnSpPr>
+          <p:cNvPr id="16" name="Straight Arrow Connector 15"/>
+          <p:cNvCxnSpPr/>
+          <p:nvPr/>
+        </p:nvCxnSpPr>
+        <p:spPr>
+          <a:xfrm>
+            <a:off x="2120252" y="2073623"/>
+            <a:ext cx="0" cy="921284"/>
+          </a:xfrm>
+          <a:prstGeom prst="straightConnector1">
+            <a:avLst/>
+          </a:prstGeom>
+          <a:ln w="28575">
+            <a:solidFill>
+              <a:schemeClr val="bg1">
+                <a:lumMod val="75000"/>
+              </a:schemeClr>
+            </a:solidFill>
+            <a:tailEnd type="triangle"/>
+          </a:ln>
+        </p:spPr>
+        <p:style>
+          <a:lnRef idx="3">
+            <a:schemeClr val="accent5"/>
+          </a:lnRef>
+          <a:fillRef idx="0">
+            <a:schemeClr val="accent5"/>
+          </a:fillRef>
+          <a:effectRef idx="2">
+            <a:schemeClr val="accent5"/>
+          </a:effectRef>
+          <a:fontRef idx="minor">
+            <a:schemeClr val="tx1"/>
+          </a:fontRef>
+        </p:style>
+      </p:cxnSp>
+      <p:sp>
+        <p:nvSpPr>
+          <p:cNvPr id="17" name="TextBox 16"/>
+          <p:cNvSpPr txBox="1"/>
+          <p:nvPr/>
+        </p:nvSpPr>
+        <p:spPr>
+          <a:xfrm>
+            <a:off x="1343675" y="3033250"/>
+            <a:ext cx="1553153" cy="715089"/>
+          </a:xfrm>
+          <a:prstGeom prst="roundRect">
+            <a:avLst/>
+          </a:prstGeom>
+          <a:noFill/>
+          <a:ln w="28575">
+            <a:noFill/>
+          </a:ln>
+        </p:spPr>
+        <p:style>
+          <a:lnRef idx="2">
+            <a:schemeClr val="dk1"/>
+          </a:lnRef>
+          <a:fillRef idx="1">
+            <a:schemeClr val="lt1"/>
+          </a:fillRef>
+          <a:effectRef idx="0">
+            <a:schemeClr val="dk1"/>
+          </a:effectRef>
+          <a:fontRef idx="minor">
+            <a:schemeClr val="dk1"/>
+          </a:fontRef>
+        </p:style>
+        <p:txBody>
+          <a:bodyPr wrap="square" rtlCol="0">
+            <a:spAutoFit/>
+          </a:bodyPr>
+          <a:lstStyle/>
+          <a:p>
+            <a:pPr algn="ctr"/>
+            <a:r>
+              <a:rPr lang="pl-PL" dirty="0" smtClean="0">
+                <a:solidFill>
+                  <a:schemeClr val="tx1">
+                    <a:lumMod val="65000"/>
+                    <a:lumOff val="35000"/>
+                  </a:schemeClr>
+                </a:solidFill>
+                <a:latin typeface="Bitter" panose="00000500000000000000" pitchFamily="50" charset="-18"/>
+              </a:rPr>
+              <a:t>Makra</a:t>
+            </a:r>
+          </a:p>
+          <a:p>
+            <a:pPr algn="ctr"/>
+            <a:r>
+              <a:rPr lang="pl-PL" dirty="0" smtClean="0">
+                <a:solidFill>
+                  <a:schemeClr val="tx1">
+                    <a:lumMod val="65000"/>
+                    <a:lumOff val="35000"/>
+                  </a:schemeClr>
+                </a:solidFill>
+                <a:latin typeface="Bitter" panose="00000500000000000000" pitchFamily="50" charset="-18"/>
+              </a:rPr>
+              <a:t>Protokoły</a:t>
+            </a:r>
+            <a:endParaRPr lang="pl-PL" dirty="0">
+              <a:solidFill>
+                <a:schemeClr val="tx1">
+                  <a:lumMod val="65000"/>
+                  <a:lumOff val="35000"/>
+                </a:schemeClr>
+              </a:solidFill>
+              <a:latin typeface="Bitter" panose="00000500000000000000" pitchFamily="50" charset="-18"/>
+            </a:endParaRPr>
+          </a:p>
+        </p:txBody>
+      </p:sp>
+      <p:cxnSp>
+        <p:nvCxnSpPr>
+          <p:cNvPr id="18" name="Straight Arrow Connector 17"/>
+          <p:cNvCxnSpPr>
+            <a:stCxn id="17" idx="2"/>
+          </p:cNvCxnSpPr>
+          <p:nvPr/>
+        </p:nvCxnSpPr>
+        <p:spPr>
+          <a:xfrm>
+            <a:off x="2120252" y="3748339"/>
+            <a:ext cx="2530406" cy="1600409"/>
+          </a:xfrm>
+          <a:prstGeom prst="straightConnector1">
+            <a:avLst/>
+          </a:prstGeom>
+          <a:ln w="28575">
+            <a:solidFill>
+              <a:schemeClr val="bg1">
+                <a:lumMod val="75000"/>
+              </a:schemeClr>
+            </a:solidFill>
+            <a:tailEnd type="triangle"/>
+          </a:ln>
+        </p:spPr>
+        <p:style>
+          <a:lnRef idx="3">
+            <a:schemeClr val="accent5"/>
+          </a:lnRef>
+          <a:fillRef idx="0">
+            <a:schemeClr val="accent5"/>
+          </a:fillRef>
+          <a:effectRef idx="2">
+            <a:schemeClr val="accent5"/>
+          </a:effectRef>
+          <a:fontRef idx="minor">
+            <a:schemeClr val="tx1"/>
+          </a:fontRef>
+        </p:style>
+      </p:cxnSp>
+      <p:cxnSp>
+        <p:nvCxnSpPr>
+          <p:cNvPr id="20" name="Straight Arrow Connector 19"/>
+          <p:cNvCxnSpPr/>
+          <p:nvPr/>
+        </p:nvCxnSpPr>
+        <p:spPr>
+          <a:xfrm>
+            <a:off x="4976522" y="3033250"/>
+            <a:ext cx="0" cy="2315498"/>
+          </a:xfrm>
+          <a:prstGeom prst="straightConnector1">
+            <a:avLst/>
+          </a:prstGeom>
+          <a:ln w="28575">
+            <a:solidFill>
+              <a:schemeClr val="bg1">
+                <a:lumMod val="75000"/>
+              </a:schemeClr>
+            </a:solidFill>
+            <a:tailEnd type="triangle"/>
+          </a:ln>
+        </p:spPr>
+        <p:style>
+          <a:lnRef idx="3">
+            <a:schemeClr val="accent5"/>
+          </a:lnRef>
+          <a:fillRef idx="0">
+            <a:schemeClr val="accent5"/>
+          </a:fillRef>
+          <a:effectRef idx="2">
+            <a:schemeClr val="accent5"/>
+          </a:effectRef>
+          <a:fontRef idx="minor">
+            <a:schemeClr val="tx1"/>
+          </a:fontRef>
+        </p:style>
+      </p:cxnSp>
+      <p:cxnSp>
+        <p:nvCxnSpPr>
+          <p:cNvPr id="22" name="Straight Arrow Connector 21"/>
+          <p:cNvCxnSpPr/>
+          <p:nvPr/>
+        </p:nvCxnSpPr>
+        <p:spPr>
+          <a:xfrm flipH="1">
+            <a:off x="5299235" y="3748339"/>
+            <a:ext cx="2523725" cy="1600409"/>
+          </a:xfrm>
+          <a:prstGeom prst="straightConnector1">
+            <a:avLst/>
+          </a:prstGeom>
+          <a:ln w="28575">
+            <a:solidFill>
+              <a:schemeClr val="bg1">
+                <a:lumMod val="75000"/>
+              </a:schemeClr>
+            </a:solidFill>
+            <a:tailEnd type="triangle"/>
+          </a:ln>
+        </p:spPr>
+        <p:style>
+          <a:lnRef idx="3">
+            <a:schemeClr val="accent5"/>
+          </a:lnRef>
+          <a:fillRef idx="0">
+            <a:schemeClr val="accent5"/>
+          </a:fillRef>
+          <a:effectRef idx="2">
+            <a:schemeClr val="accent5"/>
+          </a:effectRef>
+          <a:fontRef idx="minor">
+            <a:schemeClr val="tx1"/>
+          </a:fontRef>
+        </p:style>
+      </p:cxnSp>
+    </p:spTree>
+  </p:cSld>
+  <p:clrMapOvr>
+    <a:masterClrMapping/>
+  </p:clrMapOvr>
+  <mc:AlternateContent xmlns:mc="http://schemas.openxmlformats.org/markup-compatibility/2006" xmlns:p14="http://schemas.microsoft.com/office/powerpoint/2010/main">
+    <mc:Choice Requires="p14">
+      <p:transition spd="slow" p14:dur="2000"/>
+    </mc:Choice>
+    <mc:Fallback xmlns="">
+      <p:transition spd="slow"/>
+    </mc:Fallback>
+  </mc:AlternateContent>
+  <p:timing>
+    <p:tnLst>
+      <p:par>
+        <p:cTn id="1" dur="indefinite" restart="never" nodeType="tmRoot"/>
+      </p:par>
+    </p:tnLst>
+  </p:timing>
+</p:sld>
+</file>
+
 <file path=ppt/slides/slide5.xml><?xml version="1.0" encoding="utf-8"?>
 <p:sld xmlns:a="http://schemas.openxmlformats.org/drawingml/2006/main" xmlns:r="http://schemas.openxmlformats.org/officeDocument/2006/relationships" xmlns:p="http://schemas.openxmlformats.org/presentationml/2006/main">
   <p:cSld name="page4">

</xml_diff>